<commit_message>
Updated PPTX with slide text
</commit_message>
<xml_diff>
--- a/Publish-PPTX-Speech.pptx
+++ b/Publish-PPTX-Speech.pptx
@@ -107,6 +107,11 @@
       </a:defRPr>
     </a:lvl9pPr>
   </p:defaultTextStyle>
+  <p:extLst>
+    <p:ext uri="{EFAFB233-063F-42B5-8137-9DF3F51BA10A}">
+      <p15:sldGuideLst xmlns:p15="http://schemas.microsoft.com/office/powerpoint/2012/main"/>
+    </p:ext>
+  </p:extLst>
 </p:presentation>
 </file>
 
@@ -3366,7 +3371,11 @@
           <a:bodyPr/>
           <a:lstStyle/>
           <a:p>
-            <a:endParaRPr lang="nb-NO"/>
+            <a:r>
+              <a:rPr lang="en-US" dirty="0"/>
+              <a:t>Slide 1</a:t>
+            </a:r>
+            <a:endParaRPr lang="nb-NO" dirty="0"/>
           </a:p>
         </p:txBody>
       </p:sp>
@@ -3446,7 +3455,11 @@
           <a:bodyPr/>
           <a:lstStyle/>
           <a:p>
-            <a:endParaRPr lang="nb-NO"/>
+            <a:r>
+              <a:rPr lang="en-US" dirty="0"/>
+              <a:t>Slide 2</a:t>
+            </a:r>
+            <a:endParaRPr lang="nb-NO" dirty="0"/>
           </a:p>
         </p:txBody>
       </p:sp>
@@ -3526,7 +3539,11 @@
           <a:bodyPr/>
           <a:lstStyle/>
           <a:p>
-            <a:endParaRPr lang="nb-NO"/>
+            <a:r>
+              <a:rPr lang="en-US" dirty="0"/>
+              <a:t>Slide 3</a:t>
+            </a:r>
+            <a:endParaRPr lang="nb-NO" dirty="0"/>
           </a:p>
         </p:txBody>
       </p:sp>
@@ -3606,6 +3623,10 @@
           <a:bodyPr/>
           <a:lstStyle/>
           <a:p>
+            <a:r>
+              <a:rPr lang="en-US"/>
+              <a:t>Slide 4</a:t>
+            </a:r>
             <a:endParaRPr lang="nb-NO"/>
           </a:p>
         </p:txBody>

</xml_diff>

<commit_message>
Fixed PPTX corruption by not scripting Kiosk Mode.
</commit_message>
<xml_diff>
--- a/Publish-PPTX-Speech.pptx
+++ b/Publish-PPTX-Speech.pptx
@@ -7,8 +7,6 @@
   <p:sldIdLst>
     <p:sldId id="257" r:id="rId2"/>
     <p:sldId id="258" r:id="rId3"/>
-    <p:sldId id="259" r:id="rId4"/>
-    <p:sldId id="256" r:id="rId5"/>
   </p:sldIdLst>
   <p:sldSz cx="12192000" cy="6858000"/>
   <p:notesSz cx="6858000" cy="9144000"/>
@@ -264,7 +262,7 @@
           <a:p>
             <a:fld id="{E6C88626-B35D-4F2B-B082-5DE8C0F00F1C}" type="datetimeFigureOut">
               <a:rPr lang="nb-NO" smtClean="0"/>
-              <a:t>24.10.2019</a:t>
+              <a:t>08.11.2019</a:t>
             </a:fld>
             <a:endParaRPr lang="nb-NO"/>
           </a:p>
@@ -464,7 +462,7 @@
           <a:p>
             <a:fld id="{E6C88626-B35D-4F2B-B082-5DE8C0F00F1C}" type="datetimeFigureOut">
               <a:rPr lang="nb-NO" smtClean="0"/>
-              <a:t>24.10.2019</a:t>
+              <a:t>08.11.2019</a:t>
             </a:fld>
             <a:endParaRPr lang="nb-NO"/>
           </a:p>
@@ -674,7 +672,7 @@
           <a:p>
             <a:fld id="{E6C88626-B35D-4F2B-B082-5DE8C0F00F1C}" type="datetimeFigureOut">
               <a:rPr lang="nb-NO" smtClean="0"/>
-              <a:t>24.10.2019</a:t>
+              <a:t>08.11.2019</a:t>
             </a:fld>
             <a:endParaRPr lang="nb-NO"/>
           </a:p>
@@ -874,7 +872,7 @@
           <a:p>
             <a:fld id="{E6C88626-B35D-4F2B-B082-5DE8C0F00F1C}" type="datetimeFigureOut">
               <a:rPr lang="nb-NO" smtClean="0"/>
-              <a:t>24.10.2019</a:t>
+              <a:t>08.11.2019</a:t>
             </a:fld>
             <a:endParaRPr lang="nb-NO"/>
           </a:p>
@@ -1150,7 +1148,7 @@
           <a:p>
             <a:fld id="{E6C88626-B35D-4F2B-B082-5DE8C0F00F1C}" type="datetimeFigureOut">
               <a:rPr lang="nb-NO" smtClean="0"/>
-              <a:t>24.10.2019</a:t>
+              <a:t>08.11.2019</a:t>
             </a:fld>
             <a:endParaRPr lang="nb-NO"/>
           </a:p>
@@ -1418,7 +1416,7 @@
           <a:p>
             <a:fld id="{E6C88626-B35D-4F2B-B082-5DE8C0F00F1C}" type="datetimeFigureOut">
               <a:rPr lang="nb-NO" smtClean="0"/>
-              <a:t>24.10.2019</a:t>
+              <a:t>08.11.2019</a:t>
             </a:fld>
             <a:endParaRPr lang="nb-NO"/>
           </a:p>
@@ -1833,7 +1831,7 @@
           <a:p>
             <a:fld id="{E6C88626-B35D-4F2B-B082-5DE8C0F00F1C}" type="datetimeFigureOut">
               <a:rPr lang="nb-NO" smtClean="0"/>
-              <a:t>24.10.2019</a:t>
+              <a:t>08.11.2019</a:t>
             </a:fld>
             <a:endParaRPr lang="nb-NO"/>
           </a:p>
@@ -1975,7 +1973,7 @@
           <a:p>
             <a:fld id="{E6C88626-B35D-4F2B-B082-5DE8C0F00F1C}" type="datetimeFigureOut">
               <a:rPr lang="nb-NO" smtClean="0"/>
-              <a:t>24.10.2019</a:t>
+              <a:t>08.11.2019</a:t>
             </a:fld>
             <a:endParaRPr lang="nb-NO"/>
           </a:p>
@@ -2088,7 +2086,7 @@
           <a:p>
             <a:fld id="{E6C88626-B35D-4F2B-B082-5DE8C0F00F1C}" type="datetimeFigureOut">
               <a:rPr lang="nb-NO" smtClean="0"/>
-              <a:t>24.10.2019</a:t>
+              <a:t>08.11.2019</a:t>
             </a:fld>
             <a:endParaRPr lang="nb-NO"/>
           </a:p>
@@ -2401,7 +2399,7 @@
           <a:p>
             <a:fld id="{E6C88626-B35D-4F2B-B082-5DE8C0F00F1C}" type="datetimeFigureOut">
               <a:rPr lang="nb-NO" smtClean="0"/>
-              <a:t>24.10.2019</a:t>
+              <a:t>08.11.2019</a:t>
             </a:fld>
             <a:endParaRPr lang="nb-NO"/>
           </a:p>
@@ -2690,7 +2688,7 @@
           <a:p>
             <a:fld id="{E6C88626-B35D-4F2B-B082-5DE8C0F00F1C}" type="datetimeFigureOut">
               <a:rPr lang="nb-NO" smtClean="0"/>
-              <a:t>24.10.2019</a:t>
+              <a:t>08.11.2019</a:t>
             </a:fld>
             <a:endParaRPr lang="nb-NO"/>
           </a:p>
@@ -2933,7 +2931,7 @@
           <a:p>
             <a:fld id="{E6C88626-B35D-4F2B-B082-5DE8C0F00F1C}" type="datetimeFigureOut">
               <a:rPr lang="nb-NO" smtClean="0"/>
-              <a:t>24.10.2019</a:t>
+              <a:t>08.11.2019</a:t>
             </a:fld>
             <a:endParaRPr lang="nb-NO"/>
           </a:p>
@@ -3501,174 +3499,6 @@
 </p:sld>
 </file>
 
-<file path=ppt/slides/slide3.xml><?xml version="1.0" encoding="utf-8"?>
-<p:sld xmlns:a="http://schemas.openxmlformats.org/drawingml/2006/main" xmlns:r="http://schemas.openxmlformats.org/officeDocument/2006/relationships" xmlns:p="http://schemas.openxmlformats.org/presentationml/2006/main">
-  <p:cSld>
-    <p:spTree>
-      <p:nvGrpSpPr>
-        <p:cNvPr id="1" name=""/>
-        <p:cNvGrpSpPr/>
-        <p:nvPr/>
-      </p:nvGrpSpPr>
-      <p:grpSpPr>
-        <a:xfrm>
-          <a:off x="0" y="0"/>
-          <a:ext cx="0" cy="0"/>
-          <a:chOff x="0" y="0"/>
-          <a:chExt cx="0" cy="0"/>
-        </a:xfrm>
-      </p:grpSpPr>
-      <p:sp>
-        <p:nvSpPr>
-          <p:cNvPr id="2" name="Title 1">
-            <a:extLst>
-              <a:ext uri="{FF2B5EF4-FFF2-40B4-BE49-F238E27FC236}">
-                <a16:creationId xmlns:a16="http://schemas.microsoft.com/office/drawing/2014/main" id="{5EF59F8C-9E62-4157-A90F-0B3A2D2CFCAD}"/>
-              </a:ext>
-            </a:extLst>
-          </p:cNvPr>
-          <p:cNvSpPr>
-            <a:spLocks noGrp="1"/>
-          </p:cNvSpPr>
-          <p:nvPr>
-            <p:ph type="ctrTitle"/>
-          </p:nvPr>
-        </p:nvSpPr>
-        <p:spPr/>
-        <p:txBody>
-          <a:bodyPr/>
-          <a:lstStyle/>
-          <a:p>
-            <a:r>
-              <a:rPr lang="en-US" dirty="0"/>
-              <a:t>Slide 3</a:t>
-            </a:r>
-            <a:endParaRPr lang="nb-NO" dirty="0"/>
-          </a:p>
-        </p:txBody>
-      </p:sp>
-      <p:sp>
-        <p:nvSpPr>
-          <p:cNvPr id="3" name="Subtitle 2">
-            <a:extLst>
-              <a:ext uri="{FF2B5EF4-FFF2-40B4-BE49-F238E27FC236}">
-                <a16:creationId xmlns:a16="http://schemas.microsoft.com/office/drawing/2014/main" id="{AACEEE00-0F15-4097-9D41-B5BE258F5E32}"/>
-              </a:ext>
-            </a:extLst>
-          </p:cNvPr>
-          <p:cNvSpPr>
-            <a:spLocks noGrp="1"/>
-          </p:cNvSpPr>
-          <p:nvPr>
-            <p:ph type="subTitle" idx="1"/>
-          </p:nvPr>
-        </p:nvSpPr>
-        <p:spPr/>
-        <p:txBody>
-          <a:bodyPr/>
-          <a:lstStyle/>
-          <a:p>
-            <a:endParaRPr lang="nb-NO"/>
-          </a:p>
-        </p:txBody>
-      </p:sp>
-    </p:spTree>
-    <p:extLst>
-      <p:ext uri="{BB962C8B-B14F-4D97-AF65-F5344CB8AC3E}">
-        <p14:creationId xmlns:p14="http://schemas.microsoft.com/office/powerpoint/2010/main" val="3513139012"/>
-      </p:ext>
-    </p:extLst>
-  </p:cSld>
-  <p:clrMapOvr>
-    <a:masterClrMapping/>
-  </p:clrMapOvr>
-</p:sld>
-</file>
-
-<file path=ppt/slides/slide4.xml><?xml version="1.0" encoding="utf-8"?>
-<p:sld xmlns:a="http://schemas.openxmlformats.org/drawingml/2006/main" xmlns:r="http://schemas.openxmlformats.org/officeDocument/2006/relationships" xmlns:p="http://schemas.openxmlformats.org/presentationml/2006/main">
-  <p:cSld>
-    <p:spTree>
-      <p:nvGrpSpPr>
-        <p:cNvPr id="1" name=""/>
-        <p:cNvGrpSpPr/>
-        <p:nvPr/>
-      </p:nvGrpSpPr>
-      <p:grpSpPr>
-        <a:xfrm>
-          <a:off x="0" y="0"/>
-          <a:ext cx="0" cy="0"/>
-          <a:chOff x="0" y="0"/>
-          <a:chExt cx="0" cy="0"/>
-        </a:xfrm>
-      </p:grpSpPr>
-      <p:sp>
-        <p:nvSpPr>
-          <p:cNvPr id="2" name="Title 1">
-            <a:extLst>
-              <a:ext uri="{FF2B5EF4-FFF2-40B4-BE49-F238E27FC236}">
-                <a16:creationId xmlns:a16="http://schemas.microsoft.com/office/drawing/2014/main" id="{5EF59F8C-9E62-4157-A90F-0B3A2D2CFCAD}"/>
-              </a:ext>
-            </a:extLst>
-          </p:cNvPr>
-          <p:cNvSpPr>
-            <a:spLocks noGrp="1"/>
-          </p:cNvSpPr>
-          <p:nvPr>
-            <p:ph type="ctrTitle"/>
-          </p:nvPr>
-        </p:nvSpPr>
-        <p:spPr/>
-        <p:txBody>
-          <a:bodyPr/>
-          <a:lstStyle/>
-          <a:p>
-            <a:r>
-              <a:rPr lang="en-US"/>
-              <a:t>Slide 4</a:t>
-            </a:r>
-            <a:endParaRPr lang="nb-NO"/>
-          </a:p>
-        </p:txBody>
-      </p:sp>
-      <p:sp>
-        <p:nvSpPr>
-          <p:cNvPr id="3" name="Subtitle 2">
-            <a:extLst>
-              <a:ext uri="{FF2B5EF4-FFF2-40B4-BE49-F238E27FC236}">
-                <a16:creationId xmlns:a16="http://schemas.microsoft.com/office/drawing/2014/main" id="{AACEEE00-0F15-4097-9D41-B5BE258F5E32}"/>
-              </a:ext>
-            </a:extLst>
-          </p:cNvPr>
-          <p:cNvSpPr>
-            <a:spLocks noGrp="1"/>
-          </p:cNvSpPr>
-          <p:nvPr>
-            <p:ph type="subTitle" idx="1"/>
-          </p:nvPr>
-        </p:nvSpPr>
-        <p:spPr/>
-        <p:txBody>
-          <a:bodyPr/>
-          <a:lstStyle/>
-          <a:p>
-            <a:endParaRPr lang="nb-NO"/>
-          </a:p>
-        </p:txBody>
-      </p:sp>
-    </p:spTree>
-    <p:extLst>
-      <p:ext uri="{BB962C8B-B14F-4D97-AF65-F5344CB8AC3E}">
-        <p14:creationId xmlns:p14="http://schemas.microsoft.com/office/powerpoint/2010/main" val="3153510595"/>
-      </p:ext>
-    </p:extLst>
-  </p:cSld>
-  <p:clrMapOvr>
-    <a:masterClrMapping/>
-  </p:clrMapOvr>
-</p:sld>
-</file>
-
 <file path=ppt/theme/theme1.xml><?xml version="1.0" encoding="utf-8"?>
 <a:theme xmlns:a="http://schemas.openxmlformats.org/drawingml/2006/main" name="Office Theme">
   <a:themeElements>

</xml_diff>